<commit_message>
Update BestStateChoice2018.pptx with Kaggle and Bahar's analysis info
</commit_message>
<xml_diff>
--- a/BestStateChoice2018_Presentation.pptx
+++ b/BestStateChoice2018_Presentation.pptx
@@ -11279,7 +11279,7 @@
                 <a:latin typeface="Arial" panose="020B0604020202020204" pitchFamily="34" charset="0"/>
                 <a:cs typeface="Arial" panose="020B0604020202020204" pitchFamily="34" charset="0"/>
               </a:rPr>
-              <a:t>Top 10 States with</a:t>
+              <a:t>Top 20 States with</a:t>
             </a:r>
           </a:p>
           <a:p>
@@ -11719,14 +11719,24 @@
           <a:lstStyle/>
           <a:p>
             <a:r>
-              <a:rPr lang="en-US" dirty="0">
+              <a:rPr lang="en-US">
                 <a:solidFill>
                   <a:schemeClr val="bg1"/>
                 </a:solidFill>
                 <a:latin typeface="Arial" panose="020B0604020202020204" pitchFamily="34" charset="0"/>
                 <a:cs typeface="Arial" panose="020B0604020202020204" pitchFamily="34" charset="0"/>
               </a:rPr>
-              <a:t>Top 10 States with</a:t>
+              <a:t>Top 20 </a:t>
+            </a:r>
+            <a:r>
+              <a:rPr lang="en-US" dirty="0">
+                <a:solidFill>
+                  <a:schemeClr val="bg1"/>
+                </a:solidFill>
+                <a:latin typeface="Arial" panose="020B0604020202020204" pitchFamily="34" charset="0"/>
+                <a:cs typeface="Arial" panose="020B0604020202020204" pitchFamily="34" charset="0"/>
+              </a:rPr>
+              <a:t>States with</a:t>
             </a:r>
           </a:p>
           <a:p>
@@ -12566,6 +12576,62 @@
           </a:p>
         </p:txBody>
       </p:sp>
+      <p:sp>
+        <p:nvSpPr>
+          <p:cNvPr id="7" name="Explosion: 8 Points 6">
+            <a:extLst>
+              <a:ext uri="{FF2B5EF4-FFF2-40B4-BE49-F238E27FC236}">
+                <a16:creationId xmlns:a16="http://schemas.microsoft.com/office/drawing/2014/main" id="{18F1DFD3-854A-461C-90C1-5295D4D3325C}"/>
+              </a:ext>
+            </a:extLst>
+          </p:cNvPr>
+          <p:cNvSpPr/>
+          <p:nvPr/>
+        </p:nvSpPr>
+        <p:spPr>
+          <a:xfrm>
+            <a:off x="9750334" y="3546238"/>
+            <a:ext cx="1837591" cy="2303584"/>
+          </a:xfrm>
+          <a:prstGeom prst="irregularSeal1">
+            <a:avLst/>
+          </a:prstGeom>
+          <a:solidFill>
+            <a:srgbClr val="FFFF00"/>
+          </a:solidFill>
+        </p:spPr>
+        <p:style>
+          <a:lnRef idx="2">
+            <a:schemeClr val="accent1">
+              <a:shade val="50000"/>
+            </a:schemeClr>
+          </a:lnRef>
+          <a:fillRef idx="1">
+            <a:schemeClr val="accent1"/>
+          </a:fillRef>
+          <a:effectRef idx="0">
+            <a:schemeClr val="accent1"/>
+          </a:effectRef>
+          <a:fontRef idx="minor">
+            <a:schemeClr val="lt1"/>
+          </a:fontRef>
+        </p:style>
+        <p:txBody>
+          <a:bodyPr rtlCol="0" anchor="ctr"/>
+          <a:lstStyle/>
+          <a:p>
+            <a:pPr algn="ctr"/>
+            <a:r>
+              <a:rPr lang="en-US" dirty="0">
+                <a:solidFill>
+                  <a:srgbClr val="FF0000"/>
+                </a:solidFill>
+              </a:rPr>
+              <a:t>Texas is the winner</a:t>
+            </a:r>
+          </a:p>
+        </p:txBody>
+      </p:sp>
     </p:spTree>
     <p:extLst>
       <p:ext uri="{BB962C8B-B14F-4D97-AF65-F5344CB8AC3E}">
@@ -13065,6 +13131,11 @@
               <a:rPr lang="en-US" dirty="0"/>
               <a:t>\</a:t>
             </a:r>
+            <a:r>
+              <a:rPr lang="en-US" dirty="0" err="1"/>
+              <a:t>Bahar_homeprice</a:t>
+            </a:r>
+            <a:endParaRPr lang="en-US" dirty="0"/>
           </a:p>
           <a:p>
             <a:r>
@@ -13073,19 +13144,13 @@
             </a:r>
             <a:r>
               <a:rPr lang="en-US" dirty="0"/>
-              <a:t> NB filename = .</a:t>
+              <a:t> NB filename = </a:t>
             </a:r>
             <a:r>
               <a:rPr lang="en-US" dirty="0" err="1"/>
-              <a:t>ipynb</a:t>
+              <a:t>TotalTax_MedianHomePrice.ipynb</a:t>
             </a:r>
             <a:endParaRPr lang="en-US" dirty="0"/>
-          </a:p>
-          <a:p>
-            <a:r>
-              <a:rPr lang="en-US" dirty="0"/>
-              <a:t>Google API key file = </a:t>
-            </a:r>
           </a:p>
           <a:p>
             <a:r>
@@ -13100,18 +13165,35 @@
               <a:rPr lang="en-US" dirty="0"/>
               <a:t>\</a:t>
             </a:r>
-          </a:p>
-          <a:p>
-            <a:r>
-              <a:rPr lang="en-US" dirty="0"/>
-              <a:t>Dataset files = </a:t>
-            </a:r>
-          </a:p>
-          <a:p>
-            <a:pPr lvl="1"/>
-            <a:r>
-              <a:rPr lang="en-US" dirty="0"/>
-              <a:t>*.csv </a:t>
+            <a:r>
+              <a:rPr lang="en-US" dirty="0" err="1"/>
+              <a:t>Bahar_homeprice</a:t>
+            </a:r>
+            <a:r>
+              <a:rPr lang="en-US" dirty="0"/>
+              <a:t>\Images</a:t>
+            </a:r>
+          </a:p>
+          <a:p>
+            <a:r>
+              <a:rPr lang="en-US" dirty="0"/>
+              <a:t>Dataset files = \</a:t>
+            </a:r>
+            <a:r>
+              <a:rPr lang="en-US" dirty="0" err="1"/>
+              <a:t>The_Incredible_Quad</a:t>
+            </a:r>
+            <a:r>
+              <a:rPr lang="en-US" dirty="0"/>
+              <a:t>\</a:t>
+            </a:r>
+            <a:r>
+              <a:rPr lang="en-US" dirty="0" err="1"/>
+              <a:t>Bahar_homeprice</a:t>
+            </a:r>
+            <a:r>
+              <a:rPr lang="en-US" dirty="0"/>
+              <a:t>\</a:t>
             </a:r>
           </a:p>
         </p:txBody>
@@ -13352,6 +13434,14 @@
               <a:rPr lang="en-US" dirty="0"/>
               <a:t>\</a:t>
             </a:r>
+            <a:r>
+              <a:rPr lang="en-US" dirty="0" err="1"/>
+              <a:t>Molly_salary</a:t>
+            </a:r>
+            <a:r>
+              <a:rPr lang="en-US" dirty="0"/>
+              <a:t>\</a:t>
+            </a:r>
           </a:p>
           <a:p>
             <a:r>
@@ -13371,17 +13461,19 @@
           <a:p>
             <a:r>
               <a:rPr lang="en-US" dirty="0"/>
-              <a:t>Google API key file = </a:t>
-            </a:r>
-          </a:p>
-          <a:p>
-            <a:r>
-              <a:rPr lang="en-US" dirty="0"/>
               <a:t>Saved plots = \</a:t>
             </a:r>
             <a:r>
               <a:rPr lang="en-US" dirty="0" err="1"/>
               <a:t>The_Incredible_Quad</a:t>
+            </a:r>
+            <a:r>
+              <a:rPr lang="en-US" dirty="0"/>
+              <a:t>\ </a:t>
+            </a:r>
+            <a:r>
+              <a:rPr lang="en-US" dirty="0" err="1"/>
+              <a:t>Molly_salary</a:t>
             </a:r>
             <a:r>
               <a:rPr lang="en-US" dirty="0"/>
@@ -16512,6 +16604,17 @@
                 </a:solidFill>
               </a:rPr>
               <a:t>Zillow</a:t>
+            </a:r>
+          </a:p>
+          <a:p>
+            <a:pPr lvl="1"/>
+            <a:r>
+              <a:rPr lang="en-US" dirty="0">
+                <a:solidFill>
+                  <a:schemeClr val="accent3"/>
+                </a:solidFill>
+              </a:rPr>
+              <a:t>Kaggle</a:t>
             </a:r>
           </a:p>
           <a:p>

</xml_diff>

<commit_message>
Update BestStateChoice2018.pptx Molly's analysis info
</commit_message>
<xml_diff>
--- a/BestStateChoice2018_Presentation.pptx
+++ b/BestStateChoice2018_Presentation.pptx
@@ -13450,11 +13450,11 @@
             </a:r>
             <a:r>
               <a:rPr lang="en-US" dirty="0"/>
-              <a:t> NB filename = .</a:t>
+              <a:t> NB filename = </a:t>
             </a:r>
             <a:r>
               <a:rPr lang="en-US" dirty="0" err="1"/>
-              <a:t>ipynb</a:t>
+              <a:t>Molly_salary.ipynb</a:t>
             </a:r>
             <a:endParaRPr lang="en-US" dirty="0"/>
           </a:p>
@@ -13483,14 +13483,7 @@
           <a:p>
             <a:r>
               <a:rPr lang="en-US" dirty="0"/>
-              <a:t>Dataset files = </a:t>
-            </a:r>
-          </a:p>
-          <a:p>
-            <a:pPr lvl="1"/>
-            <a:r>
-              <a:rPr lang="en-US" dirty="0"/>
-              <a:t>*.csv </a:t>
+              <a:t>Dataset files = Average_Salary.csv</a:t>
             </a:r>
           </a:p>
         </p:txBody>

</xml_diff>